<commit_message>
Added to data management
</commit_message>
<xml_diff>
--- a/poster.pptx
+++ b/poster.pptx
@@ -300,7 +300,7 @@
       </p15:notesGuideLst>
     </p:ext>
     <p:ext uri="http://customooxmlschemas.google.com/">
-      <go:slidesCustomData xmlns="" xmlns:mc="http://schemas.openxmlformats.org/markup-compatibility/2006" xmlns:mv="urn:schemas-microsoft-com:mac:vml" xmlns:c="http://schemas.openxmlformats.org/drawingml/2006/chart" xmlns:dgm="http://schemas.openxmlformats.org/drawingml/2006/diagram" xmlns:o="urn:schemas-microsoft-com:office:office" xmlns:v="urn:schemas-microsoft-com:vml" xmlns:pvml="urn:schemas-microsoft-com:office:powerpoint" xmlns:com="http://schemas.openxmlformats.org/drawingml/2006/compatibility" xmlns:p14="http://schemas.microsoft.com/office/powerpoint/2010/main" xmlns:p15="http://schemas.microsoft.com/office/powerpoint/2012/main" xmlns:go="http://customooxmlschemas.google.com/" roundtripDataSignature="AMtx7mjk2QxoXX/VBw/uHOdZaod2bAZKEQ==" r:id="rId17"/>
+      <go:slidesCustomData xmlns:go="http://customooxmlschemas.google.com/" xmlns:p15="http://schemas.microsoft.com/office/powerpoint/2012/main" xmlns:p14="http://schemas.microsoft.com/office/powerpoint/2010/main" xmlns:com="http://schemas.openxmlformats.org/drawingml/2006/compatibility" xmlns:pvml="urn:schemas-microsoft-com:office:powerpoint" xmlns:v="urn:schemas-microsoft-com:vml" xmlns:o="urn:schemas-microsoft-com:office:office" xmlns:dgm="http://schemas.openxmlformats.org/drawingml/2006/diagram" xmlns:c="http://schemas.openxmlformats.org/drawingml/2006/chart" xmlns:mv="urn:schemas-microsoft-com:mac:vml" xmlns:mc="http://schemas.openxmlformats.org/markup-compatibility/2006" xmlns="" roundtripDataSignature="AMtx7mjk2QxoXX/VBw/uHOdZaod2bAZKEQ==" r:id="rId17"/>
     </p:ext>
   </p:extLst>
 </p:presentation>
@@ -319,37 +319,6 @@
     <p1510:client id="{B979D3DD-004F-4E44-AA19-17C205909AB5}" v="26" dt="2022-03-26T22:24:30.860"/>
   </p1510:revLst>
 </p1510:revInfo>
-</file>
-
-<file path=ppt/comments/comment1.xml><?xml version="1.0" encoding="utf-8"?>
-<p:cmLst xmlns:a="http://schemas.openxmlformats.org/drawingml/2006/main" xmlns:r="http://schemas.openxmlformats.org/officeDocument/2006/relationships" xmlns:p="http://schemas.openxmlformats.org/presentationml/2006/main">
-  <p:cm authorId="0" dt="2019-12-15T07:30:53.254" idx="1">
-    <p:pos x="8980" y="3157"/>
-    <p:text>great job on this plot! can you actually please send me the code through slack on how to get it to look like this. I'm stuck on getting this :-/</p:text>
-    <p:extLst>
-      <p:ext uri="{C676402C-5697-4E1C-873F-D02D1690AC5C}">
-        <p15:threadingInfo xmlns:p15="http://schemas.microsoft.com/office/powerpoint/2012/main" timeZoneBias="0"/>
-      </p:ext>
-      <p:ext uri="http://customooxmlschemas.google.com/">
-        <go:slidesCustomData xmlns="" xmlns:p15="http://schemas.microsoft.com/office/powerpoint/2012/main" xmlns:go="http://customooxmlschemas.google.com/" commentPostId="AAAAEAzt32Q"/>
-      </p:ext>
-    </p:extLst>
-  </p:cm>
-  <p:cm authorId="1" dt="2019-12-15T07:30:53.254" idx="1">
-    <p:pos x="8980" y="3157"/>
-    <p:text>I could not find you on slack, but I just copied the code on page 109 in the course packet. You just have to match your response variable with bmi and explanatory variable with ever_smoke. If you highlight "BMI" after you paste the code into r. You can then push "command f" ("ctrl f" on PC) and a find and replace bar will pop up. As long as your response variable is coded as  quantitative and your explanatory  as a factor it should work.</p:text>
-    <p:extLst>
-      <p:ext uri="{C676402C-5697-4E1C-873F-D02D1690AC5C}">
-        <p15:threadingInfo xmlns:p15="http://schemas.microsoft.com/office/powerpoint/2012/main" timeZoneBias="0">
-          <p15:parentCm authorId="0" idx="1"/>
-        </p15:threadingInfo>
-      </p:ext>
-      <p:ext uri="http://customooxmlschemas.google.com/">
-        <go:slidesCustomData xmlns="" xmlns:p15="http://schemas.microsoft.com/office/powerpoint/2012/main" xmlns:go="http://customooxmlschemas.google.com/" commentPostId="AAAAEA659XE"/>
-      </p:ext>
-    </p:extLst>
-  </p:cm>
-</p:cmLst>
 </file>
 
 <file path=ppt/notesMasters/notesMaster1.xml><?xml version="1.0" encoding="utf-8"?>

</xml_diff>